<commit_message>
Last updates to Report
Last updates to Report
</commit_message>
<xml_diff>
--- a/Final_Report/User Guide/10524150_DBSFinalProject_UserGuide cf v1-0 200920.pptx
+++ b/Final_Report/User Guide/10524150_DBSFinalProject_UserGuide cf v1-0 200920.pptx
@@ -5,10 +5,10 @@
     <p:sldMasterId id="2147483684" r:id="rId4"/>
   </p:sldMasterIdLst>
   <p:notesMasterIdLst>
-    <p:notesMasterId r:id="rId18"/>
+    <p:notesMasterId r:id="rId20"/>
   </p:notesMasterIdLst>
   <p:handoutMasterIdLst>
-    <p:handoutMasterId r:id="rId19"/>
+    <p:handoutMasterId r:id="rId21"/>
   </p:handoutMasterIdLst>
   <p:sldIdLst>
     <p:sldId id="256" r:id="rId5"/>
@@ -24,6 +24,8 @@
     <p:sldId id="269" r:id="rId15"/>
     <p:sldId id="270" r:id="rId16"/>
     <p:sldId id="271" r:id="rId17"/>
+    <p:sldId id="277" r:id="rId18"/>
+    <p:sldId id="278" r:id="rId19"/>
   </p:sldIdLst>
   <p:sldSz cx="12192000" cy="6858000"/>
   <p:notesSz cx="6858000" cy="9144000"/>
@@ -238,7 +240,7 @@
           <a:p>
             <a:fld id="{072BD34C-6B47-49EF-BFFA-93F1411C7C71}" type="datetime1">
               <a:rPr lang="en-GB" smtClean="0"/>
-              <a:t>20/09/2020</a:t>
+              <a:t>21/09/2020</a:t>
             </a:fld>
             <a:endParaRPr lang="en-GB" dirty="0"/>
           </a:p>
@@ -416,7 +418,7 @@
           <a:p>
             <a:fld id="{897DEE11-17EA-4842-A9E6-9439F71DE2B2}" type="datetime1">
               <a:rPr lang="en-GB" noProof="0" smtClean="0"/>
-              <a:t>20/09/2020</a:t>
+              <a:t>21/09/2020</a:t>
             </a:fld>
             <a:endParaRPr lang="en-GB" noProof="0" dirty="0"/>
           </a:p>
@@ -1104,6 +1106,174 @@
 </p:notes>
 </file>
 
+<file path=ppt/notesSlides/notesSlide14.xml><?xml version="1.0" encoding="utf-8"?>
+<p:notes xmlns:a="http://schemas.openxmlformats.org/drawingml/2006/main" xmlns:r="http://schemas.openxmlformats.org/officeDocument/2006/relationships" xmlns:p="http://schemas.openxmlformats.org/presentationml/2006/main">
+  <p:cSld>
+    <p:spTree>
+      <p:nvGrpSpPr>
+        <p:cNvPr id="1" name=""/>
+        <p:cNvGrpSpPr/>
+        <p:nvPr/>
+      </p:nvGrpSpPr>
+      <p:grpSpPr>
+        <a:xfrm>
+          <a:off x="0" y="0"/>
+          <a:ext cx="0" cy="0"/>
+          <a:chOff x="0" y="0"/>
+          <a:chExt cx="0" cy="0"/>
+        </a:xfrm>
+      </p:grpSpPr>
+      <p:sp>
+        <p:nvSpPr>
+          <p:cNvPr id="2" name="Slide Image Placeholder 1"/>
+          <p:cNvSpPr>
+            <a:spLocks noGrp="1" noRot="1" noChangeAspect="1"/>
+          </p:cNvSpPr>
+          <p:nvPr>
+            <p:ph type="sldImg"/>
+          </p:nvPr>
+        </p:nvSpPr>
+        <p:spPr/>
+      </p:sp>
+      <p:sp>
+        <p:nvSpPr>
+          <p:cNvPr id="3" name="Notes Placeholder 2"/>
+          <p:cNvSpPr>
+            <a:spLocks noGrp="1"/>
+          </p:cNvSpPr>
+          <p:nvPr>
+            <p:ph type="body" idx="1"/>
+          </p:nvPr>
+        </p:nvSpPr>
+        <p:spPr/>
+        <p:txBody>
+          <a:bodyPr/>
+          <a:lstStyle/>
+          <a:p>
+            <a:endParaRPr lang="en-GB" dirty="0"/>
+          </a:p>
+        </p:txBody>
+      </p:sp>
+      <p:sp>
+        <p:nvSpPr>
+          <p:cNvPr id="4" name="Slide Number Placeholder 3"/>
+          <p:cNvSpPr>
+            <a:spLocks noGrp="1"/>
+          </p:cNvSpPr>
+          <p:nvPr>
+            <p:ph type="sldNum" sz="quarter" idx="5"/>
+          </p:nvPr>
+        </p:nvSpPr>
+        <p:spPr/>
+        <p:txBody>
+          <a:bodyPr/>
+          <a:lstStyle/>
+          <a:p>
+            <a:fld id="{27EAE7B2-9366-49DF-AF79-27BE8880B843}" type="slidenum">
+              <a:rPr lang="en-GB" smtClean="0"/>
+              <a:t>14</a:t>
+            </a:fld>
+            <a:endParaRPr lang="en-GB" dirty="0"/>
+          </a:p>
+        </p:txBody>
+      </p:sp>
+    </p:spTree>
+    <p:extLst>
+      <p:ext uri="{BB962C8B-B14F-4D97-AF65-F5344CB8AC3E}">
+        <p14:creationId xmlns:p14="http://schemas.microsoft.com/office/powerpoint/2010/main" val="1218528654"/>
+      </p:ext>
+    </p:extLst>
+  </p:cSld>
+  <p:clrMapOvr>
+    <a:masterClrMapping/>
+  </p:clrMapOvr>
+</p:notes>
+</file>
+
+<file path=ppt/notesSlides/notesSlide15.xml><?xml version="1.0" encoding="utf-8"?>
+<p:notes xmlns:a="http://schemas.openxmlformats.org/drawingml/2006/main" xmlns:r="http://schemas.openxmlformats.org/officeDocument/2006/relationships" xmlns:p="http://schemas.openxmlformats.org/presentationml/2006/main">
+  <p:cSld>
+    <p:spTree>
+      <p:nvGrpSpPr>
+        <p:cNvPr id="1" name=""/>
+        <p:cNvGrpSpPr/>
+        <p:nvPr/>
+      </p:nvGrpSpPr>
+      <p:grpSpPr>
+        <a:xfrm>
+          <a:off x="0" y="0"/>
+          <a:ext cx="0" cy="0"/>
+          <a:chOff x="0" y="0"/>
+          <a:chExt cx="0" cy="0"/>
+        </a:xfrm>
+      </p:grpSpPr>
+      <p:sp>
+        <p:nvSpPr>
+          <p:cNvPr id="2" name="Slide Image Placeholder 1"/>
+          <p:cNvSpPr>
+            <a:spLocks noGrp="1" noRot="1" noChangeAspect="1"/>
+          </p:cNvSpPr>
+          <p:nvPr>
+            <p:ph type="sldImg"/>
+          </p:nvPr>
+        </p:nvSpPr>
+        <p:spPr/>
+      </p:sp>
+      <p:sp>
+        <p:nvSpPr>
+          <p:cNvPr id="3" name="Notes Placeholder 2"/>
+          <p:cNvSpPr>
+            <a:spLocks noGrp="1"/>
+          </p:cNvSpPr>
+          <p:nvPr>
+            <p:ph type="body" idx="1"/>
+          </p:nvPr>
+        </p:nvSpPr>
+        <p:spPr/>
+        <p:txBody>
+          <a:bodyPr/>
+          <a:lstStyle/>
+          <a:p>
+            <a:endParaRPr lang="en-GB" dirty="0"/>
+          </a:p>
+        </p:txBody>
+      </p:sp>
+      <p:sp>
+        <p:nvSpPr>
+          <p:cNvPr id="4" name="Slide Number Placeholder 3"/>
+          <p:cNvSpPr>
+            <a:spLocks noGrp="1"/>
+          </p:cNvSpPr>
+          <p:nvPr>
+            <p:ph type="sldNum" sz="quarter" idx="5"/>
+          </p:nvPr>
+        </p:nvSpPr>
+        <p:spPr/>
+        <p:txBody>
+          <a:bodyPr/>
+          <a:lstStyle/>
+          <a:p>
+            <a:fld id="{27EAE7B2-9366-49DF-AF79-27BE8880B843}" type="slidenum">
+              <a:rPr lang="en-GB" smtClean="0"/>
+              <a:t>15</a:t>
+            </a:fld>
+            <a:endParaRPr lang="en-GB" dirty="0"/>
+          </a:p>
+        </p:txBody>
+      </p:sp>
+    </p:spTree>
+    <p:extLst>
+      <p:ext uri="{BB962C8B-B14F-4D97-AF65-F5344CB8AC3E}">
+        <p14:creationId xmlns:p14="http://schemas.microsoft.com/office/powerpoint/2010/main" val="283011167"/>
+      </p:ext>
+    </p:extLst>
+  </p:cSld>
+  <p:clrMapOvr>
+    <a:masterClrMapping/>
+  </p:clrMapOvr>
+</p:notes>
+</file>
+
 <file path=ppt/notesSlides/notesSlide2.xml><?xml version="1.0" encoding="utf-8"?>
 <p:notes xmlns:a="http://schemas.openxmlformats.org/drawingml/2006/main" xmlns:r="http://schemas.openxmlformats.org/officeDocument/2006/relationships" xmlns:p="http://schemas.openxmlformats.org/presentationml/2006/main">
   <p:cSld>
@@ -1923,7 +2093,7 @@
             <a:pPr rtl="0"/>
             <a:fld id="{F5E2CC9C-DF8A-4444-80B2-7CDDD7D07081}" type="datetime1">
               <a:rPr lang="en-GB" noProof="0" smtClean="0"/>
-              <a:t>20/09/2020</a:t>
+              <a:t>21/09/2020</a:t>
             </a:fld>
             <a:endParaRPr lang="en-GB" noProof="0" dirty="0"/>
           </a:p>
@@ -2377,7 +2547,7 @@
             <a:pPr rtl="0"/>
             <a:fld id="{2B9D8EAD-2706-4FAD-A091-1D06263112A9}" type="datetime1">
               <a:rPr lang="en-GB" noProof="0" smtClean="0"/>
-              <a:t>20/09/2020</a:t>
+              <a:t>21/09/2020</a:t>
             </a:fld>
             <a:endParaRPr lang="en-GB" noProof="0" dirty="0"/>
           </a:p>
@@ -2561,7 +2731,7 @@
             <a:pPr rtl="0"/>
             <a:fld id="{3F98FA3C-4073-4ED2-8C34-C4CB27A9BD13}" type="datetime1">
               <a:rPr lang="en-GB" noProof="0" smtClean="0"/>
-              <a:t>20/09/2020</a:t>
+              <a:t>21/09/2020</a:t>
             </a:fld>
             <a:endParaRPr lang="en-GB" noProof="0" dirty="0"/>
           </a:p>
@@ -2873,7 +3043,7 @@
             <a:pPr rtl="0"/>
             <a:fld id="{052B3A79-12C6-4EFA-B1BE-2BE9D9DE6CD6}" type="datetime1">
               <a:rPr lang="en-GB" noProof="0" smtClean="0"/>
-              <a:t>20/09/2020</a:t>
+              <a:t>21/09/2020</a:t>
             </a:fld>
             <a:endParaRPr lang="en-GB" noProof="0" dirty="0"/>
           </a:p>
@@ -3113,7 +3283,7 @@
             <a:pPr rtl="0"/>
             <a:fld id="{6C857DCD-10A8-4516-8072-F1B7478C492B}" type="datetime1">
               <a:rPr lang="en-GB" noProof="0" smtClean="0"/>
-              <a:t>20/09/2020</a:t>
+              <a:t>21/09/2020</a:t>
             </a:fld>
             <a:endParaRPr lang="en-GB" noProof="0" dirty="0"/>
           </a:p>
@@ -3537,7 +3707,7 @@
             <a:pPr rtl="0"/>
             <a:fld id="{600AA6A9-7A64-4409-9008-7DBF91CBD923}" type="datetime1">
               <a:rPr lang="en-GB" noProof="0" smtClean="0"/>
-              <a:t>20/09/2020</a:t>
+              <a:t>21/09/2020</a:t>
             </a:fld>
             <a:endParaRPr lang="en-GB" noProof="0" dirty="0"/>
           </a:p>
@@ -3701,7 +3871,7 @@
             <a:pPr rtl="0"/>
             <a:fld id="{BEAEC864-4391-4A30-8AE1-7AAAC45E531A}" type="datetime1">
               <a:rPr lang="en-GB" noProof="0" smtClean="0"/>
-              <a:t>20/09/2020</a:t>
+              <a:t>21/09/2020</a:t>
             </a:fld>
             <a:endParaRPr lang="en-GB" noProof="0" dirty="0"/>
           </a:p>
@@ -3865,7 +4035,7 @@
             <a:pPr rtl="0"/>
             <a:fld id="{6B3CDAB8-1659-4B3D-B162-997A6B710019}" type="datetime1">
               <a:rPr lang="en-GB" noProof="0" smtClean="0"/>
-              <a:t>20/09/2020</a:t>
+              <a:t>21/09/2020</a:t>
             </a:fld>
             <a:endParaRPr lang="en-GB" noProof="0" dirty="0"/>
           </a:p>
@@ -4083,7 +4253,7 @@
             <a:pPr rtl="0"/>
             <a:fld id="{C23AF8DF-9D48-46DF-B804-65195FBF9992}" type="datetime1">
               <a:rPr lang="en-GB" noProof="0" smtClean="0"/>
-              <a:t>20/09/2020</a:t>
+              <a:t>21/09/2020</a:t>
             </a:fld>
             <a:endParaRPr lang="en-GB" noProof="0" dirty="0"/>
           </a:p>
@@ -4368,7 +4538,7 @@
             <a:pPr rtl="0"/>
             <a:fld id="{76B03905-D103-40A4-9AF5-DA0FA6A1985D}" type="datetime1">
               <a:rPr lang="en-GB" noProof="0" smtClean="0"/>
-              <a:t>20/09/2020</a:t>
+              <a:t>21/09/2020</a:t>
             </a:fld>
             <a:endParaRPr lang="en-GB" noProof="0" dirty="0"/>
           </a:p>
@@ -5150,7 +5320,7 @@
             <a:pPr rtl="0"/>
             <a:fld id="{20D47727-8AEF-4759-AF78-AB7780DC372D}" type="datetime1">
               <a:rPr lang="en-GB" noProof="0" smtClean="0"/>
-              <a:t>20/09/2020</a:t>
+              <a:t>21/09/2020</a:t>
             </a:fld>
             <a:endParaRPr lang="en-GB" noProof="0" dirty="0"/>
           </a:p>
@@ -7350,6 +7520,794 @@
     <p:extLst>
       <p:ext uri="{BB962C8B-B14F-4D97-AF65-F5344CB8AC3E}">
         <p14:creationId xmlns:p14="http://schemas.microsoft.com/office/powerpoint/2010/main" val="874512202"/>
+      </p:ext>
+    </p:extLst>
+  </p:cSld>
+  <p:clrMapOvr>
+    <a:masterClrMapping/>
+  </p:clrMapOvr>
+</p:sld>
+</file>
+
+<file path=ppt/slides/slide14.xml><?xml version="1.0" encoding="utf-8"?>
+<p:sld xmlns:a="http://schemas.openxmlformats.org/drawingml/2006/main" xmlns:r="http://schemas.openxmlformats.org/officeDocument/2006/relationships" xmlns:p="http://schemas.openxmlformats.org/presentationml/2006/main">
+  <p:cSld>
+    <p:spTree>
+      <p:nvGrpSpPr>
+        <p:cNvPr id="1" name=""/>
+        <p:cNvGrpSpPr/>
+        <p:nvPr/>
+      </p:nvGrpSpPr>
+      <p:grpSpPr>
+        <a:xfrm>
+          <a:off x="0" y="0"/>
+          <a:ext cx="0" cy="0"/>
+          <a:chOff x="0" y="0"/>
+          <a:chExt cx="0" cy="0"/>
+        </a:xfrm>
+      </p:grpSpPr>
+      <p:pic>
+        <p:nvPicPr>
+          <p:cNvPr id="6" name="Picture 5" descr="A screenshot of a cell phone&#10;&#10;Description automatically generated">
+            <a:extLst>
+              <a:ext uri="{FF2B5EF4-FFF2-40B4-BE49-F238E27FC236}">
+                <a16:creationId xmlns:a16="http://schemas.microsoft.com/office/drawing/2014/main" id="{AF089643-7363-4C07-B767-DB8F0B6CE5B9}"/>
+              </a:ext>
+            </a:extLst>
+          </p:cNvPr>
+          <p:cNvPicPr>
+            <a:picLocks noChangeAspect="1"/>
+          </p:cNvPicPr>
+          <p:nvPr/>
+        </p:nvPicPr>
+        <p:blipFill>
+          <a:blip r:embed="rId3"/>
+          <a:stretch>
+            <a:fillRect/>
+          </a:stretch>
+        </p:blipFill>
+        <p:spPr>
+          <a:xfrm>
+            <a:off x="3362148" y="2302085"/>
+            <a:ext cx="6944694" cy="2688868"/>
+          </a:xfrm>
+          <a:prstGeom prst="rect">
+            <a:avLst/>
+          </a:prstGeom>
+        </p:spPr>
+      </p:pic>
+      <p:sp>
+        <p:nvSpPr>
+          <p:cNvPr id="2" name="Title 1">
+            <a:extLst>
+              <a:ext uri="{FF2B5EF4-FFF2-40B4-BE49-F238E27FC236}">
+                <a16:creationId xmlns:a16="http://schemas.microsoft.com/office/drawing/2014/main" id="{5A29E978-9605-417C-951F-53F4926CFF1A}"/>
+              </a:ext>
+            </a:extLst>
+          </p:cNvPr>
+          <p:cNvSpPr>
+            <a:spLocks noGrp="1"/>
+          </p:cNvSpPr>
+          <p:nvPr>
+            <p:ph type="title"/>
+          </p:nvPr>
+        </p:nvSpPr>
+        <p:spPr>
+          <a:xfrm>
+            <a:off x="1290909" y="798974"/>
+            <a:ext cx="9610182" cy="601226"/>
+          </a:xfrm>
+        </p:spPr>
+        <p:txBody>
+          <a:bodyPr rtlCol="0"/>
+          <a:lstStyle/>
+          <a:p>
+            <a:pPr rtl="0"/>
+            <a:r>
+              <a:rPr lang="en-GB" dirty="0"/>
+              <a:t>Fraud ‘ Production’ Interface (7)</a:t>
+            </a:r>
+          </a:p>
+        </p:txBody>
+      </p:sp>
+      <p:sp>
+        <p:nvSpPr>
+          <p:cNvPr id="4" name="Text Placeholder 3">
+            <a:extLst>
+              <a:ext uri="{FF2B5EF4-FFF2-40B4-BE49-F238E27FC236}">
+                <a16:creationId xmlns:a16="http://schemas.microsoft.com/office/drawing/2014/main" id="{4986B87E-83DC-455A-94FE-389658903147}"/>
+              </a:ext>
+            </a:extLst>
+          </p:cNvPr>
+          <p:cNvSpPr>
+            <a:spLocks noGrp="1"/>
+          </p:cNvSpPr>
+          <p:nvPr>
+            <p:ph type="body" sz="half" idx="2"/>
+          </p:nvPr>
+        </p:nvSpPr>
+        <p:spPr>
+          <a:xfrm>
+            <a:off x="1156439" y="1510637"/>
+            <a:ext cx="9610182" cy="3836725"/>
+          </a:xfrm>
+        </p:spPr>
+        <p:txBody>
+          <a:bodyPr rtlCol="0">
+            <a:normAutofit/>
+          </a:bodyPr>
+          <a:lstStyle/>
+          <a:p>
+            <a:pPr marL="285750" indent="-285750">
+              <a:buFont typeface="Arial" panose="020B0604020202020204" pitchFamily="34" charset="0"/>
+              <a:buChar char="•"/>
+            </a:pPr>
+            <a:r>
+              <a:rPr lang="en-GB" dirty="0"/>
+              <a:t>In addition, the API for fraud prediction can be invoked by a separate button to show the actual predictive score from the Logistic Regression Classification model. </a:t>
+            </a:r>
+          </a:p>
+          <a:p>
+            <a:pPr rtl="0"/>
+            <a:endParaRPr lang="en-GB" dirty="0"/>
+          </a:p>
+        </p:txBody>
+      </p:sp>
+      <p:pic>
+        <p:nvPicPr>
+          <p:cNvPr id="5" name="Picture 4"/>
+          <p:cNvPicPr>
+            <a:picLocks noChangeAspect="1"/>
+          </p:cNvPicPr>
+          <p:nvPr/>
+        </p:nvPicPr>
+        <p:blipFill>
+          <a:blip r:embed="rId4">
+            <a:extLst>
+              <a:ext uri="{28A0092B-C50C-407E-A947-70E740481C1C}">
+                <a14:useLocalDpi xmlns:a14="http://schemas.microsoft.com/office/drawing/2010/main" val="0"/>
+              </a:ext>
+            </a:extLst>
+          </a:blip>
+          <a:stretch>
+            <a:fillRect/>
+          </a:stretch>
+        </p:blipFill>
+        <p:spPr>
+          <a:xfrm>
+            <a:off x="9556376" y="89646"/>
+            <a:ext cx="1376980" cy="1308847"/>
+          </a:xfrm>
+          <a:prstGeom prst="rect">
+            <a:avLst/>
+          </a:prstGeom>
+        </p:spPr>
+      </p:pic>
+      <p:pic>
+        <p:nvPicPr>
+          <p:cNvPr id="8" name="Picture 7">
+            <a:extLst>
+              <a:ext uri="{FF2B5EF4-FFF2-40B4-BE49-F238E27FC236}">
+                <a16:creationId xmlns:a16="http://schemas.microsoft.com/office/drawing/2014/main" id="{E6CDD537-CCEE-4A2B-9FF6-88B2D05DDB17}"/>
+              </a:ext>
+            </a:extLst>
+          </p:cNvPr>
+          <p:cNvPicPr>
+            <a:picLocks noChangeAspect="1"/>
+          </p:cNvPicPr>
+          <p:nvPr/>
+        </p:nvPicPr>
+        <p:blipFill>
+          <a:blip r:embed="rId5">
+            <a:extLst>
+              <a:ext uri="{28A0092B-C50C-407E-A947-70E740481C1C}">
+                <a14:useLocalDpi xmlns:a14="http://schemas.microsoft.com/office/drawing/2010/main" val="0"/>
+              </a:ext>
+            </a:extLst>
+          </a:blip>
+          <a:stretch>
+            <a:fillRect/>
+          </a:stretch>
+        </p:blipFill>
+        <p:spPr>
+          <a:xfrm>
+            <a:off x="1544258" y="4850060"/>
+            <a:ext cx="788253" cy="441422"/>
+          </a:xfrm>
+          <a:prstGeom prst="rect">
+            <a:avLst/>
+          </a:prstGeom>
+          <a:ln>
+            <a:noFill/>
+          </a:ln>
+          <a:effectLst>
+            <a:outerShdw blurRad="292100" dist="139700" dir="2700000" algn="tl" rotWithShape="0">
+              <a:srgbClr val="333333">
+                <a:alpha val="65000"/>
+              </a:srgbClr>
+            </a:outerShdw>
+          </a:effectLst>
+        </p:spPr>
+      </p:pic>
+      <p:sp>
+        <p:nvSpPr>
+          <p:cNvPr id="13" name="Arrow: Curved Right 12">
+            <a:extLst>
+              <a:ext uri="{FF2B5EF4-FFF2-40B4-BE49-F238E27FC236}">
+                <a16:creationId xmlns:a16="http://schemas.microsoft.com/office/drawing/2014/main" id="{41D28CDC-5774-4EB4-B52D-DD9E2E37E768}"/>
+              </a:ext>
+            </a:extLst>
+          </p:cNvPr>
+          <p:cNvSpPr/>
+          <p:nvPr/>
+        </p:nvSpPr>
+        <p:spPr>
+          <a:xfrm rot="3944949">
+            <a:off x="2215790" y="3226843"/>
+            <a:ext cx="455858" cy="2129734"/>
+          </a:xfrm>
+          <a:prstGeom prst="curvedRightArrow">
+            <a:avLst/>
+          </a:prstGeom>
+          <a:solidFill>
+            <a:schemeClr val="accent1">
+              <a:lumMod val="60000"/>
+              <a:lumOff val="40000"/>
+            </a:schemeClr>
+          </a:solidFill>
+          <a:ln>
+            <a:noFill/>
+          </a:ln>
+        </p:spPr>
+        <p:style>
+          <a:lnRef idx="3">
+            <a:schemeClr val="lt1"/>
+          </a:lnRef>
+          <a:fillRef idx="1">
+            <a:schemeClr val="accent1"/>
+          </a:fillRef>
+          <a:effectRef idx="1">
+            <a:schemeClr val="accent1"/>
+          </a:effectRef>
+          <a:fontRef idx="minor">
+            <a:schemeClr val="lt1"/>
+          </a:fontRef>
+        </p:style>
+        <p:txBody>
+          <a:bodyPr rtlCol="0" anchor="ctr"/>
+          <a:lstStyle/>
+          <a:p>
+            <a:pPr algn="ctr"/>
+            <a:endParaRPr lang="en-IE" dirty="0">
+              <a:solidFill>
+                <a:schemeClr val="tx1"/>
+              </a:solidFill>
+            </a:endParaRPr>
+          </a:p>
+        </p:txBody>
+      </p:sp>
+      <p:sp>
+        <p:nvSpPr>
+          <p:cNvPr id="17" name="Arrow: Curved Right 16">
+            <a:extLst>
+              <a:ext uri="{FF2B5EF4-FFF2-40B4-BE49-F238E27FC236}">
+                <a16:creationId xmlns:a16="http://schemas.microsoft.com/office/drawing/2014/main" id="{CA43057D-EF57-4200-957C-28036236EADA}"/>
+              </a:ext>
+            </a:extLst>
+          </p:cNvPr>
+          <p:cNvSpPr/>
+          <p:nvPr/>
+        </p:nvSpPr>
+        <p:spPr>
+          <a:xfrm rot="15563433">
+            <a:off x="2980877" y="4166376"/>
+            <a:ext cx="446954" cy="2129342"/>
+          </a:xfrm>
+          <a:prstGeom prst="curvedRightArrow">
+            <a:avLst/>
+          </a:prstGeom>
+          <a:solidFill>
+            <a:schemeClr val="accent1">
+              <a:lumMod val="60000"/>
+              <a:lumOff val="40000"/>
+            </a:schemeClr>
+          </a:solidFill>
+          <a:ln>
+            <a:noFill/>
+          </a:ln>
+        </p:spPr>
+        <p:style>
+          <a:lnRef idx="3">
+            <a:schemeClr val="lt1"/>
+          </a:lnRef>
+          <a:fillRef idx="1">
+            <a:schemeClr val="accent1"/>
+          </a:fillRef>
+          <a:effectRef idx="1">
+            <a:schemeClr val="accent1"/>
+          </a:effectRef>
+          <a:fontRef idx="minor">
+            <a:schemeClr val="lt1"/>
+          </a:fontRef>
+        </p:style>
+        <p:txBody>
+          <a:bodyPr rtlCol="0" anchor="ctr"/>
+          <a:lstStyle/>
+          <a:p>
+            <a:pPr algn="ctr"/>
+            <a:endParaRPr lang="en-IE" dirty="0">
+              <a:solidFill>
+                <a:schemeClr val="tx1"/>
+              </a:solidFill>
+            </a:endParaRPr>
+          </a:p>
+        </p:txBody>
+      </p:sp>
+      <p:pic>
+        <p:nvPicPr>
+          <p:cNvPr id="7" name="Picture 6">
+            <a:extLst>
+              <a:ext uri="{FF2B5EF4-FFF2-40B4-BE49-F238E27FC236}">
+                <a16:creationId xmlns:a16="http://schemas.microsoft.com/office/drawing/2014/main" id="{92DD555A-BDBE-4E3E-B326-B621B2997E9F}"/>
+              </a:ext>
+            </a:extLst>
+          </p:cNvPr>
+          <p:cNvPicPr>
+            <a:picLocks noChangeAspect="1"/>
+          </p:cNvPicPr>
+          <p:nvPr/>
+        </p:nvPicPr>
+        <p:blipFill>
+          <a:blip r:embed="rId6">
+            <a:extLst>
+              <a:ext uri="{28A0092B-C50C-407E-A947-70E740481C1C}">
+                <a14:useLocalDpi xmlns:a14="http://schemas.microsoft.com/office/drawing/2010/main" val="0"/>
+              </a:ext>
+            </a:extLst>
+          </a:blip>
+          <a:stretch>
+            <a:fillRect/>
+          </a:stretch>
+        </p:blipFill>
+        <p:spPr>
+          <a:xfrm rot="14655075">
+            <a:off x="5178299" y="3461677"/>
+            <a:ext cx="374228" cy="710050"/>
+          </a:xfrm>
+          <a:prstGeom prst="rect">
+            <a:avLst/>
+          </a:prstGeom>
+        </p:spPr>
+      </p:pic>
+    </p:spTree>
+    <p:extLst>
+      <p:ext uri="{BB962C8B-B14F-4D97-AF65-F5344CB8AC3E}">
+        <p14:creationId xmlns:p14="http://schemas.microsoft.com/office/powerpoint/2010/main" val="1394253463"/>
+      </p:ext>
+    </p:extLst>
+  </p:cSld>
+  <p:clrMapOvr>
+    <a:masterClrMapping/>
+  </p:clrMapOvr>
+</p:sld>
+</file>
+
+<file path=ppt/slides/slide15.xml><?xml version="1.0" encoding="utf-8"?>
+<p:sld xmlns:a="http://schemas.openxmlformats.org/drawingml/2006/main" xmlns:r="http://schemas.openxmlformats.org/officeDocument/2006/relationships" xmlns:p="http://schemas.openxmlformats.org/presentationml/2006/main">
+  <p:cSld>
+    <p:spTree>
+      <p:nvGrpSpPr>
+        <p:cNvPr id="1" name=""/>
+        <p:cNvGrpSpPr/>
+        <p:nvPr/>
+      </p:nvGrpSpPr>
+      <p:grpSpPr>
+        <a:xfrm>
+          <a:off x="0" y="0"/>
+          <a:ext cx="0" cy="0"/>
+          <a:chOff x="0" y="0"/>
+          <a:chExt cx="0" cy="0"/>
+        </a:xfrm>
+      </p:grpSpPr>
+      <p:pic>
+        <p:nvPicPr>
+          <p:cNvPr id="6" name="Picture 5">
+            <a:extLst>
+              <a:ext uri="{FF2B5EF4-FFF2-40B4-BE49-F238E27FC236}">
+                <a16:creationId xmlns:a16="http://schemas.microsoft.com/office/drawing/2014/main" id="{B526AB02-874D-4123-9B98-49D9AF8DAFA4}"/>
+              </a:ext>
+            </a:extLst>
+          </p:cNvPr>
+          <p:cNvPicPr>
+            <a:picLocks noChangeAspect="1"/>
+          </p:cNvPicPr>
+          <p:nvPr/>
+        </p:nvPicPr>
+        <p:blipFill>
+          <a:blip r:embed="rId3"/>
+          <a:stretch>
+            <a:fillRect/>
+          </a:stretch>
+        </p:blipFill>
+        <p:spPr>
+          <a:xfrm>
+            <a:off x="643369" y="2141037"/>
+            <a:ext cx="5849166" cy="447737"/>
+          </a:xfrm>
+          <a:prstGeom prst="rect">
+            <a:avLst/>
+          </a:prstGeom>
+        </p:spPr>
+      </p:pic>
+      <p:sp>
+        <p:nvSpPr>
+          <p:cNvPr id="2" name="Title 1">
+            <a:extLst>
+              <a:ext uri="{FF2B5EF4-FFF2-40B4-BE49-F238E27FC236}">
+                <a16:creationId xmlns:a16="http://schemas.microsoft.com/office/drawing/2014/main" id="{5A29E978-9605-417C-951F-53F4926CFF1A}"/>
+              </a:ext>
+            </a:extLst>
+          </p:cNvPr>
+          <p:cNvSpPr>
+            <a:spLocks noGrp="1"/>
+          </p:cNvSpPr>
+          <p:nvPr>
+            <p:ph type="title"/>
+          </p:nvPr>
+        </p:nvSpPr>
+        <p:spPr>
+          <a:xfrm>
+            <a:off x="1290909" y="798974"/>
+            <a:ext cx="9610182" cy="601226"/>
+          </a:xfrm>
+        </p:spPr>
+        <p:txBody>
+          <a:bodyPr rtlCol="0"/>
+          <a:lstStyle/>
+          <a:p>
+            <a:pPr rtl="0"/>
+            <a:r>
+              <a:rPr lang="en-GB" dirty="0"/>
+              <a:t>Fraud ‘ Production’ Interface (8)</a:t>
+            </a:r>
+          </a:p>
+        </p:txBody>
+      </p:sp>
+      <p:sp>
+        <p:nvSpPr>
+          <p:cNvPr id="4" name="Text Placeholder 3">
+            <a:extLst>
+              <a:ext uri="{FF2B5EF4-FFF2-40B4-BE49-F238E27FC236}">
+                <a16:creationId xmlns:a16="http://schemas.microsoft.com/office/drawing/2014/main" id="{4986B87E-83DC-455A-94FE-389658903147}"/>
+              </a:ext>
+            </a:extLst>
+          </p:cNvPr>
+          <p:cNvSpPr>
+            <a:spLocks noGrp="1"/>
+          </p:cNvSpPr>
+          <p:nvPr>
+            <p:ph type="body" sz="half" idx="2"/>
+          </p:nvPr>
+        </p:nvSpPr>
+        <p:spPr>
+          <a:xfrm>
+            <a:off x="1290909" y="1510637"/>
+            <a:ext cx="9610182" cy="3836725"/>
+          </a:xfrm>
+        </p:spPr>
+        <p:txBody>
+          <a:bodyPr rtlCol="0">
+            <a:normAutofit/>
+          </a:bodyPr>
+          <a:lstStyle/>
+          <a:p>
+            <a:pPr marL="285750" indent="-285750">
+              <a:buFont typeface="Arial" panose="020B0604020202020204" pitchFamily="34" charset="0"/>
+              <a:buChar char="•"/>
+            </a:pPr>
+            <a:r>
+              <a:rPr lang="en-GB" dirty="0"/>
+              <a:t>The lowest button on the tab will return the full output from the Azure hosted predictive model.</a:t>
+            </a:r>
+          </a:p>
+          <a:p>
+            <a:pPr rtl="0"/>
+            <a:endParaRPr lang="en-GB" dirty="0"/>
+          </a:p>
+        </p:txBody>
+      </p:sp>
+      <p:pic>
+        <p:nvPicPr>
+          <p:cNvPr id="5" name="Picture 4"/>
+          <p:cNvPicPr>
+            <a:picLocks noChangeAspect="1"/>
+          </p:cNvPicPr>
+          <p:nvPr/>
+        </p:nvPicPr>
+        <p:blipFill>
+          <a:blip r:embed="rId4">
+            <a:extLst>
+              <a:ext uri="{28A0092B-C50C-407E-A947-70E740481C1C}">
+                <a14:useLocalDpi xmlns:a14="http://schemas.microsoft.com/office/drawing/2010/main" val="0"/>
+              </a:ext>
+            </a:extLst>
+          </a:blip>
+          <a:stretch>
+            <a:fillRect/>
+          </a:stretch>
+        </p:blipFill>
+        <p:spPr>
+          <a:xfrm>
+            <a:off x="9556376" y="89646"/>
+            <a:ext cx="1376980" cy="1308847"/>
+          </a:xfrm>
+          <a:prstGeom prst="rect">
+            <a:avLst/>
+          </a:prstGeom>
+        </p:spPr>
+      </p:pic>
+      <p:pic>
+        <p:nvPicPr>
+          <p:cNvPr id="8" name="Picture 7">
+            <a:extLst>
+              <a:ext uri="{FF2B5EF4-FFF2-40B4-BE49-F238E27FC236}">
+                <a16:creationId xmlns:a16="http://schemas.microsoft.com/office/drawing/2014/main" id="{E6CDD537-CCEE-4A2B-9FF6-88B2D05DDB17}"/>
+              </a:ext>
+            </a:extLst>
+          </p:cNvPr>
+          <p:cNvPicPr>
+            <a:picLocks noChangeAspect="1"/>
+          </p:cNvPicPr>
+          <p:nvPr/>
+        </p:nvPicPr>
+        <p:blipFill>
+          <a:blip r:embed="rId5">
+            <a:extLst>
+              <a:ext uri="{28A0092B-C50C-407E-A947-70E740481C1C}">
+                <a14:useLocalDpi xmlns:a14="http://schemas.microsoft.com/office/drawing/2010/main" val="0"/>
+              </a:ext>
+            </a:extLst>
+          </a:blip>
+          <a:stretch>
+            <a:fillRect/>
+          </a:stretch>
+        </p:blipFill>
+        <p:spPr>
+          <a:xfrm>
+            <a:off x="2717048" y="3202572"/>
+            <a:ext cx="788253" cy="441422"/>
+          </a:xfrm>
+          <a:prstGeom prst="rect">
+            <a:avLst/>
+          </a:prstGeom>
+          <a:ln>
+            <a:noFill/>
+          </a:ln>
+          <a:effectLst>
+            <a:outerShdw blurRad="292100" dist="139700" dir="2700000" algn="tl" rotWithShape="0">
+              <a:srgbClr val="333333">
+                <a:alpha val="65000"/>
+              </a:srgbClr>
+            </a:outerShdw>
+          </a:effectLst>
+        </p:spPr>
+      </p:pic>
+      <p:sp>
+        <p:nvSpPr>
+          <p:cNvPr id="13" name="Arrow: Curved Right 12">
+            <a:extLst>
+              <a:ext uri="{FF2B5EF4-FFF2-40B4-BE49-F238E27FC236}">
+                <a16:creationId xmlns:a16="http://schemas.microsoft.com/office/drawing/2014/main" id="{41D28CDC-5774-4EB4-B52D-DD9E2E37E768}"/>
+              </a:ext>
+            </a:extLst>
+          </p:cNvPr>
+          <p:cNvSpPr/>
+          <p:nvPr/>
+        </p:nvSpPr>
+        <p:spPr>
+          <a:xfrm rot="17925702">
+            <a:off x="1513343" y="2170875"/>
+            <a:ext cx="455858" cy="2129734"/>
+          </a:xfrm>
+          <a:prstGeom prst="curvedRightArrow">
+            <a:avLst/>
+          </a:prstGeom>
+          <a:solidFill>
+            <a:schemeClr val="accent1">
+              <a:lumMod val="60000"/>
+              <a:lumOff val="40000"/>
+            </a:schemeClr>
+          </a:solidFill>
+          <a:ln>
+            <a:noFill/>
+          </a:ln>
+        </p:spPr>
+        <p:style>
+          <a:lnRef idx="3">
+            <a:schemeClr val="lt1"/>
+          </a:lnRef>
+          <a:fillRef idx="1">
+            <a:schemeClr val="accent1"/>
+          </a:fillRef>
+          <a:effectRef idx="1">
+            <a:schemeClr val="accent1"/>
+          </a:effectRef>
+          <a:fontRef idx="minor">
+            <a:schemeClr val="lt1"/>
+          </a:fontRef>
+        </p:style>
+        <p:txBody>
+          <a:bodyPr rtlCol="0" anchor="ctr"/>
+          <a:lstStyle/>
+          <a:p>
+            <a:pPr algn="ctr"/>
+            <a:endParaRPr lang="en-IE" dirty="0">
+              <a:solidFill>
+                <a:schemeClr val="tx1"/>
+              </a:solidFill>
+            </a:endParaRPr>
+          </a:p>
+        </p:txBody>
+      </p:sp>
+      <p:pic>
+        <p:nvPicPr>
+          <p:cNvPr id="10" name="Picture 9" descr="A screenshot of a cell phone&#10;&#10;Description automatically generated">
+            <a:extLst>
+              <a:ext uri="{FF2B5EF4-FFF2-40B4-BE49-F238E27FC236}">
+                <a16:creationId xmlns:a16="http://schemas.microsoft.com/office/drawing/2014/main" id="{9FCD0D49-D5BE-410D-B650-D33D5C8AE4CD}"/>
+              </a:ext>
+            </a:extLst>
+          </p:cNvPr>
+          <p:cNvPicPr>
+            <a:picLocks noChangeAspect="1"/>
+          </p:cNvPicPr>
+          <p:nvPr/>
+        </p:nvPicPr>
+        <p:blipFill>
+          <a:blip r:embed="rId6"/>
+          <a:stretch>
+            <a:fillRect/>
+          </a:stretch>
+        </p:blipFill>
+        <p:spPr>
+          <a:xfrm>
+            <a:off x="6346977" y="1694329"/>
+            <a:ext cx="5365002" cy="4870415"/>
+          </a:xfrm>
+          <a:prstGeom prst="rect">
+            <a:avLst/>
+          </a:prstGeom>
+          <a:solidFill>
+            <a:srgbClr val="FFFFFF">
+              <a:shade val="85000"/>
+            </a:srgbClr>
+          </a:solidFill>
+          <a:ln w="101600" cap="sq">
+            <a:solidFill>
+              <a:srgbClr val="FDFDFD"/>
+            </a:solidFill>
+            <a:miter lim="800000"/>
+          </a:ln>
+          <a:effectLst>
+            <a:outerShdw blurRad="57150" dist="37500" dir="7560000" sy="98000" kx="110000" ky="200000" algn="tl" rotWithShape="0">
+              <a:srgbClr val="000000">
+                <a:alpha val="20000"/>
+              </a:srgbClr>
+            </a:outerShdw>
+          </a:effectLst>
+          <a:scene3d>
+            <a:camera prst="perspectiveRelaxed">
+              <a:rot lat="18960000" lon="0" rev="0"/>
+            </a:camera>
+            <a:lightRig rig="twoPt" dir="t">
+              <a:rot lat="0" lon="0" rev="7200000"/>
+            </a:lightRig>
+          </a:scene3d>
+          <a:sp3d prstMaterial="matte">
+            <a:bevelT w="22860" h="12700"/>
+            <a:contourClr>
+              <a:srgbClr val="FFFFFF"/>
+            </a:contourClr>
+          </a:sp3d>
+        </p:spPr>
+      </p:pic>
+      <p:pic>
+        <p:nvPicPr>
+          <p:cNvPr id="12" name="Picture 11">
+            <a:extLst>
+              <a:ext uri="{FF2B5EF4-FFF2-40B4-BE49-F238E27FC236}">
+                <a16:creationId xmlns:a16="http://schemas.microsoft.com/office/drawing/2014/main" id="{D5E076A3-69E3-4691-ADF1-07670CF8734E}"/>
+              </a:ext>
+            </a:extLst>
+          </p:cNvPr>
+          <p:cNvPicPr>
+            <a:picLocks noChangeAspect="1"/>
+          </p:cNvPicPr>
+          <p:nvPr/>
+        </p:nvPicPr>
+        <p:blipFill>
+          <a:blip r:embed="rId7">
+            <a:extLst>
+              <a:ext uri="{28A0092B-C50C-407E-A947-70E740481C1C}">
+                <a14:useLocalDpi xmlns:a14="http://schemas.microsoft.com/office/drawing/2010/main" val="0"/>
+              </a:ext>
+            </a:extLst>
+          </a:blip>
+          <a:stretch>
+            <a:fillRect/>
+          </a:stretch>
+        </p:blipFill>
+        <p:spPr>
+          <a:xfrm rot="8975257">
+            <a:off x="780025" y="1662070"/>
+            <a:ext cx="374228" cy="710050"/>
+          </a:xfrm>
+          <a:prstGeom prst="rect">
+            <a:avLst/>
+          </a:prstGeom>
+        </p:spPr>
+      </p:pic>
+      <p:sp>
+        <p:nvSpPr>
+          <p:cNvPr id="21" name="Arrow: Curved Right 20">
+            <a:extLst>
+              <a:ext uri="{FF2B5EF4-FFF2-40B4-BE49-F238E27FC236}">
+                <a16:creationId xmlns:a16="http://schemas.microsoft.com/office/drawing/2014/main" id="{C2E27F86-13CC-425A-9B00-D51805A4DB2D}"/>
+              </a:ext>
+            </a:extLst>
+          </p:cNvPr>
+          <p:cNvSpPr/>
+          <p:nvPr/>
+        </p:nvSpPr>
+        <p:spPr>
+          <a:xfrm rot="16423707">
+            <a:off x="4725982" y="2382486"/>
+            <a:ext cx="446954" cy="3121984"/>
+          </a:xfrm>
+          <a:prstGeom prst="curvedRightArrow">
+            <a:avLst/>
+          </a:prstGeom>
+          <a:solidFill>
+            <a:schemeClr val="accent1">
+              <a:lumMod val="60000"/>
+              <a:lumOff val="40000"/>
+            </a:schemeClr>
+          </a:solidFill>
+          <a:ln>
+            <a:noFill/>
+          </a:ln>
+        </p:spPr>
+        <p:style>
+          <a:lnRef idx="3">
+            <a:schemeClr val="lt1"/>
+          </a:lnRef>
+          <a:fillRef idx="1">
+            <a:schemeClr val="accent1"/>
+          </a:fillRef>
+          <a:effectRef idx="1">
+            <a:schemeClr val="accent1"/>
+          </a:effectRef>
+          <a:fontRef idx="minor">
+            <a:schemeClr val="lt1"/>
+          </a:fontRef>
+        </p:style>
+        <p:txBody>
+          <a:bodyPr rtlCol="0" anchor="ctr"/>
+          <a:lstStyle/>
+          <a:p>
+            <a:pPr algn="ctr"/>
+            <a:endParaRPr lang="en-IE" dirty="0">
+              <a:solidFill>
+                <a:schemeClr val="tx1"/>
+              </a:solidFill>
+            </a:endParaRPr>
+          </a:p>
+        </p:txBody>
+      </p:sp>
+    </p:spTree>
+    <p:extLst>
+      <p:ext uri="{BB962C8B-B14F-4D97-AF65-F5344CB8AC3E}">
+        <p14:creationId xmlns:p14="http://schemas.microsoft.com/office/powerpoint/2010/main" val="1017058663"/>
       </p:ext>
     </p:extLst>
   </p:cSld>

</xml_diff>